<commit_message>
und die Grafiken dazu
</commit_message>
<xml_diff>
--- a/pics/Radarsignale.pptx
+++ b/pics/Radarsignale.pptx
@@ -289,7 +289,7 @@
           <a:p>
             <a:fld id="{69777522-9240-45B8-9D1D-62CB9EDDAC34}" type="datetimeFigureOut">
               <a:rPr lang="de-DE" smtClean="0"/>
-              <a:t>14.01.2019</a:t>
+              <a:t>15.03.2019</a:t>
             </a:fld>
             <a:endParaRPr lang="de-DE"/>
           </a:p>
@@ -459,7 +459,7 @@
           <a:p>
             <a:fld id="{69777522-9240-45B8-9D1D-62CB9EDDAC34}" type="datetimeFigureOut">
               <a:rPr lang="de-DE" smtClean="0"/>
-              <a:t>14.01.2019</a:t>
+              <a:t>15.03.2019</a:t>
             </a:fld>
             <a:endParaRPr lang="de-DE"/>
           </a:p>
@@ -639,7 +639,7 @@
           <a:p>
             <a:fld id="{69777522-9240-45B8-9D1D-62CB9EDDAC34}" type="datetimeFigureOut">
               <a:rPr lang="de-DE" smtClean="0"/>
-              <a:t>14.01.2019</a:t>
+              <a:t>15.03.2019</a:t>
             </a:fld>
             <a:endParaRPr lang="de-DE"/>
           </a:p>
@@ -809,7 +809,7 @@
           <a:p>
             <a:fld id="{69777522-9240-45B8-9D1D-62CB9EDDAC34}" type="datetimeFigureOut">
               <a:rPr lang="de-DE" smtClean="0"/>
-              <a:t>14.01.2019</a:t>
+              <a:t>15.03.2019</a:t>
             </a:fld>
             <a:endParaRPr lang="de-DE"/>
           </a:p>
@@ -1055,7 +1055,7 @@
           <a:p>
             <a:fld id="{69777522-9240-45B8-9D1D-62CB9EDDAC34}" type="datetimeFigureOut">
               <a:rPr lang="de-DE" smtClean="0"/>
-              <a:t>14.01.2019</a:t>
+              <a:t>15.03.2019</a:t>
             </a:fld>
             <a:endParaRPr lang="de-DE"/>
           </a:p>
@@ -1343,7 +1343,7 @@
           <a:p>
             <a:fld id="{69777522-9240-45B8-9D1D-62CB9EDDAC34}" type="datetimeFigureOut">
               <a:rPr lang="de-DE" smtClean="0"/>
-              <a:t>14.01.2019</a:t>
+              <a:t>15.03.2019</a:t>
             </a:fld>
             <a:endParaRPr lang="de-DE"/>
           </a:p>
@@ -1765,7 +1765,7 @@
           <a:p>
             <a:fld id="{69777522-9240-45B8-9D1D-62CB9EDDAC34}" type="datetimeFigureOut">
               <a:rPr lang="de-DE" smtClean="0"/>
-              <a:t>14.01.2019</a:t>
+              <a:t>15.03.2019</a:t>
             </a:fld>
             <a:endParaRPr lang="de-DE"/>
           </a:p>
@@ -1883,7 +1883,7 @@
           <a:p>
             <a:fld id="{69777522-9240-45B8-9D1D-62CB9EDDAC34}" type="datetimeFigureOut">
               <a:rPr lang="de-DE" smtClean="0"/>
-              <a:t>14.01.2019</a:t>
+              <a:t>15.03.2019</a:t>
             </a:fld>
             <a:endParaRPr lang="de-DE"/>
           </a:p>
@@ -1978,7 +1978,7 @@
           <a:p>
             <a:fld id="{69777522-9240-45B8-9D1D-62CB9EDDAC34}" type="datetimeFigureOut">
               <a:rPr lang="de-DE" smtClean="0"/>
-              <a:t>14.01.2019</a:t>
+              <a:t>15.03.2019</a:t>
             </a:fld>
             <a:endParaRPr lang="de-DE"/>
           </a:p>
@@ -2255,7 +2255,7 @@
           <a:p>
             <a:fld id="{69777522-9240-45B8-9D1D-62CB9EDDAC34}" type="datetimeFigureOut">
               <a:rPr lang="de-DE" smtClean="0"/>
-              <a:t>14.01.2019</a:t>
+              <a:t>15.03.2019</a:t>
             </a:fld>
             <a:endParaRPr lang="de-DE"/>
           </a:p>
@@ -2508,7 +2508,7 @@
           <a:p>
             <a:fld id="{69777522-9240-45B8-9D1D-62CB9EDDAC34}" type="datetimeFigureOut">
               <a:rPr lang="de-DE" smtClean="0"/>
-              <a:t>14.01.2019</a:t>
+              <a:t>15.03.2019</a:t>
             </a:fld>
             <a:endParaRPr lang="de-DE"/>
           </a:p>
@@ -2721,7 +2721,7 @@
           <a:p>
             <a:fld id="{69777522-9240-45B8-9D1D-62CB9EDDAC34}" type="datetimeFigureOut">
               <a:rPr lang="de-DE" smtClean="0"/>
-              <a:t>14.01.2019</a:t>
+              <a:t>15.03.2019</a:t>
             </a:fld>
             <a:endParaRPr lang="de-DE"/>
           </a:p>
@@ -3104,10 +3104,10 @@
         </p:nvGrpSpPr>
         <p:grpSpPr>
           <a:xfrm>
-            <a:off x="1451508" y="908720"/>
-            <a:ext cx="4488644" cy="3659885"/>
-            <a:chOff x="1692492" y="1411775"/>
-            <a:chExt cx="2684623" cy="2456903"/>
+            <a:off x="1347046" y="1124743"/>
+            <a:ext cx="4719366" cy="3520808"/>
+            <a:chOff x="1630014" y="1556792"/>
+            <a:chExt cx="2822616" cy="2363539"/>
           </a:xfrm>
         </p:grpSpPr>
         <p:cxnSp>
@@ -3124,7 +3124,7 @@
             <a:prstGeom prst="straightConnector1">
               <a:avLst/>
             </a:prstGeom>
-            <a:ln>
+            <a:ln w="12700">
               <a:solidFill>
                 <a:schemeClr val="tx1"/>
               </a:solidFill>
@@ -3161,7 +3161,7 @@
             <a:prstGeom prst="straightConnector1">
               <a:avLst/>
             </a:prstGeom>
-            <a:ln>
+            <a:ln w="12700">
               <a:solidFill>
                 <a:schemeClr val="tx1"/>
               </a:solidFill>
@@ -3212,7 +3212,7 @@
               <a:prstGeom prst="straightConnector1">
                 <a:avLst/>
               </a:prstGeom>
-              <a:ln>
+              <a:ln w="12700">
                 <a:solidFill>
                   <a:schemeClr val="tx1"/>
                 </a:solidFill>
@@ -3249,7 +3249,7 @@
               <a:prstGeom prst="straightConnector1">
                 <a:avLst/>
               </a:prstGeom>
-              <a:ln>
+              <a:ln w="12700">
                 <a:solidFill>
                   <a:schemeClr val="tx1"/>
                 </a:solidFill>
@@ -3286,7 +3286,7 @@
               <a:prstGeom prst="straightConnector1">
                 <a:avLst/>
               </a:prstGeom>
-              <a:ln>
+              <a:ln w="12700">
                 <a:solidFill>
                   <a:schemeClr val="tx1"/>
                 </a:solidFill>
@@ -3338,7 +3338,7 @@
               <a:prstGeom prst="straightConnector1">
                 <a:avLst/>
               </a:prstGeom>
-              <a:ln>
+              <a:ln w="12700">
                 <a:solidFill>
                   <a:schemeClr val="tx1"/>
                 </a:solidFill>
@@ -3376,7 +3376,7 @@
               <a:prstGeom prst="straightConnector1">
                 <a:avLst/>
               </a:prstGeom>
-              <a:ln>
+              <a:ln w="12700">
                 <a:solidFill>
                   <a:schemeClr val="tx1"/>
                 </a:solidFill>
@@ -3414,7 +3414,7 @@
               <a:prstGeom prst="straightConnector1">
                 <a:avLst/>
               </a:prstGeom>
-              <a:ln>
+              <a:ln w="12700">
                 <a:solidFill>
                   <a:schemeClr val="tx1"/>
                 </a:solidFill>
@@ -3447,8 +3447,8 @@
           </p:nvSpPr>
           <p:spPr>
             <a:xfrm rot="16200000">
-              <a:off x="1464865" y="1639402"/>
-              <a:ext cx="716863" cy="261610"/>
+              <a:off x="1409760" y="1795178"/>
+              <a:ext cx="642994" cy="202486"/>
             </a:xfrm>
             <a:prstGeom prst="rect">
               <a:avLst/>
@@ -3462,10 +3462,10 @@
             <a:lstStyle/>
             <a:p>
               <a:r>
-                <a:rPr lang="de-DE" sz="1100" dirty="0" smtClean="0"/>
+                <a:rPr lang="de-DE" sz="1600" dirty="0" smtClean="0"/>
                 <a:t>Frequenz</a:t>
               </a:r>
-              <a:endParaRPr lang="de-DE" sz="1100" dirty="0"/>
+              <a:endParaRPr lang="de-DE" sz="1600" dirty="0"/>
             </a:p>
           </p:txBody>
         </p:sp>
@@ -3477,8 +3477,8 @@
           </p:nvSpPr>
           <p:spPr>
             <a:xfrm>
-              <a:off x="2137609" y="2230073"/>
-              <a:ext cx="775214" cy="175620"/>
+              <a:off x="2051473" y="2185205"/>
+              <a:ext cx="1044362" cy="227273"/>
             </a:xfrm>
             <a:prstGeom prst="rect">
               <a:avLst/>
@@ -3492,10 +3492,10 @@
             <a:lstStyle/>
             <a:p>
               <a:r>
-                <a:rPr lang="de-DE" sz="1100" dirty="0" smtClean="0"/>
+                <a:rPr lang="de-DE" sz="1600" dirty="0" smtClean="0"/>
                 <a:t>Gesendetes Signal</a:t>
               </a:r>
-              <a:endParaRPr lang="de-DE" sz="1100" dirty="0"/>
+              <a:endParaRPr lang="de-DE" sz="1600" dirty="0"/>
             </a:p>
           </p:txBody>
         </p:sp>
@@ -3508,7 +3508,7 @@
           <p:spPr>
             <a:xfrm>
               <a:off x="3042025" y="3070566"/>
-              <a:ext cx="861349" cy="175620"/>
+              <a:ext cx="1162820" cy="227273"/>
             </a:xfrm>
             <a:prstGeom prst="rect">
               <a:avLst/>
@@ -3522,10 +3522,10 @@
             <a:lstStyle/>
             <a:p>
               <a:r>
-                <a:rPr lang="de-DE" sz="1100" dirty="0" smtClean="0"/>
+                <a:rPr lang="de-DE" sz="1600" dirty="0" smtClean="0"/>
                 <a:t>Empfangenes Signal</a:t>
               </a:r>
-              <a:endParaRPr lang="de-DE" sz="1100" dirty="0"/>
+              <a:endParaRPr lang="de-DE" sz="1600" dirty="0"/>
             </a:p>
           </p:txBody>
         </p:sp>
@@ -3539,13 +3539,13 @@
           </p:nvCxnSpPr>
           <p:spPr>
             <a:xfrm>
-              <a:off x="2525216" y="2405693"/>
-              <a:ext cx="330716" cy="447250"/>
+              <a:off x="2573654" y="2412478"/>
+              <a:ext cx="282278" cy="395603"/>
             </a:xfrm>
             <a:prstGeom prst="straightConnector1">
               <a:avLst/>
             </a:prstGeom>
-            <a:ln>
+            <a:ln w="12700">
               <a:solidFill>
                 <a:schemeClr val="tx1"/>
               </a:solidFill>
@@ -3579,12 +3579,12 @@
           <p:spPr>
             <a:xfrm flipH="1" flipV="1">
               <a:off x="3203848" y="2636912"/>
-              <a:ext cx="268851" cy="433654"/>
+              <a:ext cx="419587" cy="433653"/>
             </a:xfrm>
             <a:prstGeom prst="straightConnector1">
               <a:avLst/>
             </a:prstGeom>
-            <a:ln>
+            <a:ln w="12700">
               <a:solidFill>
                 <a:schemeClr val="tx1"/>
               </a:solidFill>
@@ -3621,7 +3621,7 @@
             <a:prstGeom prst="straightConnector1">
               <a:avLst/>
             </a:prstGeom>
-            <a:ln>
+            <a:ln w="19050">
               <a:solidFill>
                 <a:srgbClr val="C00000"/>
               </a:solidFill>
@@ -3652,8 +3652,8 @@
           </p:nvSpPr>
           <p:spPr>
             <a:xfrm>
-              <a:off x="3470696" y="1954672"/>
-              <a:ext cx="865355" cy="175620"/>
+              <a:off x="3257362" y="1935500"/>
+              <a:ext cx="1195268" cy="227273"/>
             </a:xfrm>
             <a:prstGeom prst="rect">
               <a:avLst/>
@@ -3667,14 +3667,14 @@
             <a:lstStyle/>
             <a:p>
               <a:r>
-                <a:rPr lang="de-DE" sz="1100" dirty="0" smtClean="0">
+                <a:rPr lang="de-DE" sz="1600" dirty="0" smtClean="0">
                   <a:solidFill>
                     <a:srgbClr val="C00000"/>
                   </a:solidFill>
                 </a:rPr>
                 <a:t>Dopplerverschiebung</a:t>
               </a:r>
-              <a:endParaRPr lang="de-DE" sz="1100" dirty="0">
+              <a:endParaRPr lang="de-DE" sz="1600" dirty="0">
                 <a:solidFill>
                   <a:srgbClr val="C00000"/>
                 </a:solidFill>
@@ -3690,8 +3690,8 @@
           </p:nvSpPr>
           <p:spPr>
             <a:xfrm>
-              <a:off x="4110325" y="3693058"/>
-              <a:ext cx="266790" cy="175620"/>
+              <a:off x="4032575" y="3693058"/>
+              <a:ext cx="376987" cy="227273"/>
             </a:xfrm>
             <a:prstGeom prst="rect">
               <a:avLst/>
@@ -3705,10 +3705,10 @@
             <a:lstStyle/>
             <a:p>
               <a:r>
-                <a:rPr lang="de-DE" sz="1100" dirty="0" smtClean="0"/>
+                <a:rPr lang="de-DE" sz="1600" dirty="0" smtClean="0"/>
                 <a:t>Zeit</a:t>
               </a:r>
-              <a:endParaRPr lang="de-DE" sz="1100" dirty="0"/>
+              <a:endParaRPr lang="de-DE" sz="1200" dirty="0"/>
             </a:p>
           </p:txBody>
         </p:sp>
@@ -3757,7 +3757,7 @@
           <a:prstGeom prst="straightConnector1">
             <a:avLst/>
           </a:prstGeom>
-          <a:ln>
+          <a:ln w="12700">
             <a:solidFill>
               <a:schemeClr val="tx1"/>
             </a:solidFill>
@@ -3788,13 +3788,13 @@
         </p:nvCxnSpPr>
         <p:spPr>
           <a:xfrm flipH="1">
-            <a:off x="1688060" y="4342708"/>
-            <a:ext cx="4213865" cy="0"/>
+            <a:off x="1688064" y="4342708"/>
+            <a:ext cx="4311885" cy="0"/>
           </a:xfrm>
           <a:prstGeom prst="straightConnector1">
             <a:avLst/>
           </a:prstGeom>
-          <a:ln>
+          <a:ln w="12700">
             <a:solidFill>
               <a:schemeClr val="tx1"/>
             </a:solidFill>
@@ -3825,8 +3825,8 @@
         </p:nvSpPr>
         <p:spPr>
           <a:xfrm rot="16200000">
-            <a:off x="1133396" y="1223949"/>
-            <a:ext cx="1067863" cy="437407"/>
+            <a:off x="1082214" y="1484666"/>
+            <a:ext cx="957826" cy="338554"/>
           </a:xfrm>
           <a:prstGeom prst="rect">
             <a:avLst/>
@@ -3840,10 +3840,10 @@
           <a:lstStyle/>
           <a:p>
             <a:r>
-              <a:rPr lang="de-DE" sz="1100" dirty="0" smtClean="0"/>
+              <a:rPr lang="de-DE" sz="1600" dirty="0" smtClean="0"/>
               <a:t>Frequenz</a:t>
             </a:r>
-            <a:endParaRPr lang="de-DE" sz="1100" dirty="0"/>
+            <a:endParaRPr lang="de-DE" sz="1600" dirty="0"/>
           </a:p>
         </p:txBody>
       </p:sp>
@@ -3855,8 +3855,8 @@
         </p:nvSpPr>
         <p:spPr>
           <a:xfrm>
-            <a:off x="2641990" y="1714975"/>
-            <a:ext cx="1296145" cy="261609"/>
+            <a:off x="2333088" y="1386192"/>
+            <a:ext cx="1731558" cy="338554"/>
           </a:xfrm>
           <a:prstGeom prst="rect">
             <a:avLst/>
@@ -3870,10 +3870,10 @@
           <a:lstStyle/>
           <a:p>
             <a:r>
-              <a:rPr lang="de-DE" sz="1100" dirty="0" smtClean="0"/>
+              <a:rPr lang="de-DE" sz="1600" dirty="0" smtClean="0"/>
               <a:t>Gesendetes Signal</a:t>
             </a:r>
-            <a:endParaRPr lang="de-DE" sz="1100" dirty="0"/>
+            <a:endParaRPr lang="de-DE" sz="1600" dirty="0"/>
           </a:p>
         </p:txBody>
       </p:sp>
@@ -3885,8 +3885,8 @@
         </p:nvSpPr>
         <p:spPr>
           <a:xfrm>
-            <a:off x="3316549" y="3959479"/>
-            <a:ext cx="1440161" cy="261609"/>
+            <a:off x="3059833" y="3959479"/>
+            <a:ext cx="1872208" cy="338554"/>
           </a:xfrm>
           <a:prstGeom prst="rect">
             <a:avLst/>
@@ -3900,91 +3900,13 @@
           <a:lstStyle/>
           <a:p>
             <a:r>
-              <a:rPr lang="de-DE" sz="1100" dirty="0" smtClean="0"/>
+              <a:rPr lang="de-DE" sz="1600" dirty="0" smtClean="0"/>
               <a:t>Empfangenes Signal</a:t>
             </a:r>
-            <a:endParaRPr lang="de-DE" sz="1100" dirty="0"/>
-          </a:p>
-        </p:txBody>
-      </p:sp>
-      <p:cxnSp>
-        <p:nvCxnSpPr>
-          <p:cNvPr id="12" name="Gerade Verbindung mit Pfeil 11"/>
-          <p:cNvCxnSpPr>
-            <a:stCxn id="10" idx="2"/>
-          </p:cNvCxnSpPr>
-          <p:nvPr/>
-        </p:nvCxnSpPr>
-        <p:spPr>
-          <a:xfrm>
-            <a:off x="3290062" y="1976585"/>
-            <a:ext cx="552951" cy="666239"/>
-          </a:xfrm>
-          <a:prstGeom prst="straightConnector1">
-            <a:avLst/>
-          </a:prstGeom>
-          <a:ln>
-            <a:solidFill>
-              <a:schemeClr val="tx1"/>
-            </a:solidFill>
-            <a:headEnd type="none" w="med" len="med"/>
-            <a:tailEnd type="triangle" w="med" len="med"/>
-          </a:ln>
-        </p:spPr>
-        <p:style>
-          <a:lnRef idx="1">
-            <a:schemeClr val="accent1"/>
-          </a:lnRef>
-          <a:fillRef idx="0">
-            <a:schemeClr val="accent1"/>
-          </a:fillRef>
-          <a:effectRef idx="0">
-            <a:schemeClr val="accent1"/>
-          </a:effectRef>
-          <a:fontRef idx="minor">
-            <a:schemeClr val="tx1"/>
-          </a:fontRef>
-        </p:style>
-      </p:cxnSp>
-      <p:cxnSp>
-        <p:nvCxnSpPr>
-          <p:cNvPr id="13" name="Gerade Verbindung mit Pfeil 12"/>
-          <p:cNvCxnSpPr>
-            <a:stCxn id="11" idx="0"/>
-          </p:cNvCxnSpPr>
-          <p:nvPr/>
-        </p:nvCxnSpPr>
-        <p:spPr>
-          <a:xfrm flipH="1" flipV="1">
-            <a:off x="3587114" y="3313494"/>
-            <a:ext cx="449514" cy="645986"/>
-          </a:xfrm>
-          <a:prstGeom prst="straightConnector1">
-            <a:avLst/>
-          </a:prstGeom>
-          <a:ln>
-            <a:solidFill>
-              <a:schemeClr val="tx1"/>
-            </a:solidFill>
-            <a:headEnd type="none" w="med" len="med"/>
-            <a:tailEnd type="triangle" w="med" len="med"/>
-          </a:ln>
-        </p:spPr>
-        <p:style>
-          <a:lnRef idx="1">
-            <a:schemeClr val="accent1"/>
-          </a:lnRef>
-          <a:fillRef idx="0">
-            <a:schemeClr val="accent1"/>
-          </a:fillRef>
-          <a:effectRef idx="0">
-            <a:schemeClr val="accent1"/>
-          </a:effectRef>
-          <a:fontRef idx="minor">
-            <a:schemeClr val="tx1"/>
-          </a:fontRef>
-        </p:style>
-      </p:cxnSp>
+            <a:endParaRPr lang="de-DE" sz="1600" dirty="0"/>
+          </a:p>
+        </p:txBody>
+      </p:sp>
       <p:sp>
         <p:nvSpPr>
           <p:cNvPr id="16" name="Textfeld 15"/>
@@ -3993,8 +3915,8 @@
         </p:nvSpPr>
         <p:spPr>
           <a:xfrm>
-            <a:off x="5491200" y="4306996"/>
-            <a:ext cx="446068" cy="261609"/>
+            <a:off x="5436096" y="4310692"/>
+            <a:ext cx="588243" cy="338554"/>
           </a:xfrm>
           <a:prstGeom prst="rect">
             <a:avLst/>
@@ -4008,27 +3930,105 @@
           <a:lstStyle/>
           <a:p>
             <a:r>
-              <a:rPr lang="de-DE" sz="1100" dirty="0" smtClean="0"/>
+              <a:rPr lang="de-DE" sz="1600" dirty="0" smtClean="0"/>
               <a:t>Zeit</a:t>
             </a:r>
-            <a:endParaRPr lang="de-DE" sz="1100" dirty="0"/>
+            <a:endParaRPr lang="de-DE" sz="1600" dirty="0"/>
           </a:p>
         </p:txBody>
       </p:sp>
       <p:grpSp>
         <p:nvGrpSpPr>
-          <p:cNvPr id="33" name="Gruppieren 32"/>
+          <p:cNvPr id="2" name="Gruppieren 1"/>
           <p:cNvGrpSpPr/>
           <p:nvPr/>
         </p:nvGrpSpPr>
         <p:grpSpPr>
           <a:xfrm>
-            <a:off x="1694315" y="2348880"/>
-            <a:ext cx="3685414" cy="1570359"/>
-            <a:chOff x="1694315" y="2348880"/>
-            <a:chExt cx="3685414" cy="1570359"/>
+            <a:off x="1694315" y="1724746"/>
+            <a:ext cx="4161649" cy="2234731"/>
+            <a:chOff x="1694315" y="2263251"/>
+            <a:chExt cx="4389853" cy="1696230"/>
           </a:xfrm>
         </p:grpSpPr>
+        <p:cxnSp>
+          <p:nvCxnSpPr>
+            <p:cNvPr id="12" name="Gerade Verbindung mit Pfeil 11"/>
+            <p:cNvCxnSpPr>
+              <a:stCxn id="10" idx="2"/>
+            </p:cNvCxnSpPr>
+            <p:nvPr/>
+          </p:nvCxnSpPr>
+          <p:spPr>
+            <a:xfrm>
+              <a:off x="3281369" y="2263251"/>
+              <a:ext cx="461364" cy="473736"/>
+            </a:xfrm>
+            <a:prstGeom prst="straightConnector1">
+              <a:avLst/>
+            </a:prstGeom>
+            <a:ln>
+              <a:solidFill>
+                <a:schemeClr val="tx1"/>
+              </a:solidFill>
+              <a:headEnd type="none" w="med" len="med"/>
+              <a:tailEnd type="triangle" w="med" len="med"/>
+            </a:ln>
+          </p:spPr>
+          <p:style>
+            <a:lnRef idx="1">
+              <a:schemeClr val="accent1"/>
+            </a:lnRef>
+            <a:fillRef idx="0">
+              <a:schemeClr val="accent1"/>
+            </a:fillRef>
+            <a:effectRef idx="0">
+              <a:schemeClr val="accent1"/>
+            </a:effectRef>
+            <a:fontRef idx="minor">
+              <a:schemeClr val="tx1"/>
+            </a:fontRef>
+          </p:style>
+        </p:cxnSp>
+        <p:cxnSp>
+          <p:nvCxnSpPr>
+            <p:cNvPr id="13" name="Gerade Verbindung mit Pfeil 12"/>
+            <p:cNvCxnSpPr>
+              <a:stCxn id="11" idx="0"/>
+            </p:cNvCxnSpPr>
+            <p:nvPr/>
+          </p:nvCxnSpPr>
+          <p:spPr>
+            <a:xfrm flipH="1" flipV="1">
+              <a:off x="3587119" y="3313497"/>
+              <a:ext cx="535027" cy="645984"/>
+            </a:xfrm>
+            <a:prstGeom prst="straightConnector1">
+              <a:avLst/>
+            </a:prstGeom>
+            <a:ln>
+              <a:solidFill>
+                <a:schemeClr val="tx1"/>
+              </a:solidFill>
+              <a:headEnd type="none" w="med" len="med"/>
+              <a:tailEnd type="triangle" w="med" len="med"/>
+            </a:ln>
+          </p:spPr>
+          <p:style>
+            <a:lnRef idx="1">
+              <a:schemeClr val="accent1"/>
+            </a:lnRef>
+            <a:fillRef idx="0">
+              <a:schemeClr val="accent1"/>
+            </a:fillRef>
+            <a:effectRef idx="0">
+              <a:schemeClr val="accent1"/>
+            </a:effectRef>
+            <a:fontRef idx="minor">
+              <a:schemeClr val="tx1"/>
+            </a:fontRef>
+          </p:style>
+        </p:cxnSp>
         <p:cxnSp>
           <p:nvCxnSpPr>
             <p:cNvPr id="21" name="Gerade Verbindung mit Pfeil 20"/>
@@ -4043,7 +4043,7 @@
             <a:prstGeom prst="straightConnector1">
               <a:avLst/>
             </a:prstGeom>
-            <a:ln>
+            <a:ln w="12700">
               <a:solidFill>
                 <a:schemeClr val="tx1"/>
               </a:solidFill>
@@ -4080,7 +4080,7 @@
             <a:prstGeom prst="straightConnector1">
               <a:avLst/>
             </a:prstGeom>
-            <a:ln>
+            <a:ln w="12700">
               <a:solidFill>
                 <a:schemeClr val="tx1"/>
               </a:solidFill>
@@ -4117,7 +4117,7 @@
             <a:prstGeom prst="straightConnector1">
               <a:avLst/>
             </a:prstGeom>
-            <a:ln>
+            <a:ln w="12700">
               <a:solidFill>
                 <a:schemeClr val="tx1"/>
               </a:solidFill>
@@ -4154,7 +4154,7 @@
             <a:prstGeom prst="straightConnector1">
               <a:avLst/>
             </a:prstGeom>
-            <a:ln>
+            <a:ln w="12700">
               <a:solidFill>
                 <a:schemeClr val="tx1"/>
               </a:solidFill>
@@ -4191,7 +4191,7 @@
             <a:prstGeom prst="straightConnector1">
               <a:avLst/>
             </a:prstGeom>
-            <a:ln>
+            <a:ln w="12700">
               <a:solidFill>
                 <a:schemeClr val="tx1"/>
               </a:solidFill>
@@ -4214,21 +4214,6 @@
             </a:fontRef>
           </p:style>
         </p:cxnSp>
-      </p:grpSp>
-      <p:grpSp>
-        <p:nvGrpSpPr>
-          <p:cNvPr id="34" name="Gruppieren 33"/>
-          <p:cNvGrpSpPr/>
-          <p:nvPr/>
-        </p:nvGrpSpPr>
-        <p:grpSpPr>
-          <a:xfrm>
-            <a:off x="1846715" y="2348880"/>
-            <a:ext cx="3685414" cy="1570359"/>
-            <a:chOff x="1694315" y="2348880"/>
-            <a:chExt cx="3685414" cy="1570359"/>
-          </a:xfrm>
-        </p:grpSpPr>
         <p:cxnSp>
           <p:nvCxnSpPr>
             <p:cNvPr id="35" name="Gerade Verbindung mit Pfeil 34"/>
@@ -4237,13 +4222,13 @@
           </p:nvCxnSpPr>
           <p:spPr>
             <a:xfrm flipH="1">
-              <a:off x="1694315" y="2348880"/>
+              <a:off x="1846715" y="2348880"/>
               <a:ext cx="1042797" cy="1564766"/>
             </a:xfrm>
             <a:prstGeom prst="straightConnector1">
               <a:avLst/>
             </a:prstGeom>
-            <a:ln>
+            <a:ln w="12700">
               <a:solidFill>
                 <a:schemeClr val="tx1"/>
               </a:solidFill>
@@ -4275,13 +4260,13 @@
           </p:nvCxnSpPr>
           <p:spPr>
             <a:xfrm flipH="1">
-              <a:off x="3013588" y="2348880"/>
+              <a:off x="3165988" y="2348880"/>
               <a:ext cx="1042797" cy="1564766"/>
             </a:xfrm>
             <a:prstGeom prst="straightConnector1">
               <a:avLst/>
             </a:prstGeom>
-            <a:ln>
+            <a:ln w="12700">
               <a:solidFill>
                 <a:schemeClr val="tx1"/>
               </a:solidFill>
@@ -4313,13 +4298,13 @@
           </p:nvCxnSpPr>
           <p:spPr>
             <a:xfrm flipH="1">
-              <a:off x="4336932" y="2354473"/>
+              <a:off x="4489332" y="2354473"/>
               <a:ext cx="1042797" cy="1564766"/>
             </a:xfrm>
             <a:prstGeom prst="straightConnector1">
               <a:avLst/>
             </a:prstGeom>
-            <a:ln>
+            <a:ln w="12700">
               <a:solidFill>
                 <a:schemeClr val="tx1"/>
               </a:solidFill>
@@ -4351,13 +4336,13 @@
           </p:nvCxnSpPr>
           <p:spPr>
             <a:xfrm>
-              <a:off x="2737112" y="2354473"/>
+              <a:off x="2889512" y="2354473"/>
               <a:ext cx="276475" cy="1559172"/>
             </a:xfrm>
             <a:prstGeom prst="straightConnector1">
               <a:avLst/>
             </a:prstGeom>
-            <a:ln>
+            <a:ln w="12700">
               <a:solidFill>
                 <a:schemeClr val="tx1"/>
               </a:solidFill>
@@ -4389,13 +4374,13 @@
           </p:nvCxnSpPr>
           <p:spPr>
             <a:xfrm>
-              <a:off x="4056385" y="2351677"/>
+              <a:off x="4208785" y="2351677"/>
               <a:ext cx="276475" cy="1559172"/>
             </a:xfrm>
             <a:prstGeom prst="straightConnector1">
               <a:avLst/>
             </a:prstGeom>
-            <a:ln>
+            <a:ln w="12700">
               <a:solidFill>
                 <a:schemeClr val="tx1"/>
               </a:solidFill>
@@ -4419,189 +4404,189 @@
             </a:fontRef>
           </p:style>
         </p:cxnSp>
+        <p:cxnSp>
+          <p:nvCxnSpPr>
+            <p:cNvPr id="41" name="Gerade Verbindung 40"/>
+            <p:cNvCxnSpPr/>
+            <p:nvPr/>
+          </p:nvCxnSpPr>
+          <p:spPr>
+            <a:xfrm>
+              <a:off x="5404194" y="2332888"/>
+              <a:ext cx="601703" cy="0"/>
+            </a:xfrm>
+            <a:prstGeom prst="line">
+              <a:avLst/>
+            </a:prstGeom>
+            <a:ln w="19050">
+              <a:solidFill>
+                <a:schemeClr val="tx1"/>
+              </a:solidFill>
+            </a:ln>
+          </p:spPr>
+          <p:style>
+            <a:lnRef idx="1">
+              <a:schemeClr val="accent1"/>
+            </a:lnRef>
+            <a:fillRef idx="0">
+              <a:schemeClr val="accent1"/>
+            </a:fillRef>
+            <a:effectRef idx="0">
+              <a:schemeClr val="accent1"/>
+            </a:effectRef>
+            <a:fontRef idx="minor">
+              <a:schemeClr val="tx1"/>
+            </a:fontRef>
+          </p:style>
+        </p:cxnSp>
+        <p:cxnSp>
+          <p:nvCxnSpPr>
+            <p:cNvPr id="42" name="Gerade Verbindung 41"/>
+            <p:cNvCxnSpPr/>
+            <p:nvPr/>
+          </p:nvCxnSpPr>
+          <p:spPr>
+            <a:xfrm>
+              <a:off x="5554473" y="3925502"/>
+              <a:ext cx="529695" cy="0"/>
+            </a:xfrm>
+            <a:prstGeom prst="line">
+              <a:avLst/>
+            </a:prstGeom>
+            <a:ln w="19050">
+              <a:solidFill>
+                <a:schemeClr val="tx1"/>
+              </a:solidFill>
+            </a:ln>
+          </p:spPr>
+          <p:style>
+            <a:lnRef idx="1">
+              <a:schemeClr val="accent1"/>
+            </a:lnRef>
+            <a:fillRef idx="0">
+              <a:schemeClr val="accent1"/>
+            </a:fillRef>
+            <a:effectRef idx="0">
+              <a:schemeClr val="accent1"/>
+            </a:effectRef>
+            <a:fontRef idx="minor">
+              <a:schemeClr val="tx1"/>
+            </a:fontRef>
+          </p:style>
+        </p:cxnSp>
+        <p:cxnSp>
+          <p:nvCxnSpPr>
+            <p:cNvPr id="43" name="Gerade Verbindung mit Pfeil 42"/>
+            <p:cNvCxnSpPr/>
+            <p:nvPr/>
+          </p:nvCxnSpPr>
+          <p:spPr>
+            <a:xfrm>
+              <a:off x="5375645" y="2348880"/>
+              <a:ext cx="276475" cy="1559172"/>
+            </a:xfrm>
+            <a:prstGeom prst="straightConnector1">
+              <a:avLst/>
+            </a:prstGeom>
+            <a:ln w="12700">
+              <a:solidFill>
+                <a:schemeClr val="tx1"/>
+              </a:solidFill>
+              <a:headEnd type="none" w="med" len="med"/>
+              <a:tailEnd type="none" w="med" len="med"/>
+            </a:ln>
+          </p:spPr>
+          <p:style>
+            <a:lnRef idx="1">
+              <a:schemeClr val="accent1"/>
+            </a:lnRef>
+            <a:fillRef idx="0">
+              <a:schemeClr val="accent1"/>
+            </a:fillRef>
+            <a:effectRef idx="0">
+              <a:schemeClr val="accent1"/>
+            </a:effectRef>
+            <a:fontRef idx="minor">
+              <a:schemeClr val="tx1"/>
+            </a:fontRef>
+          </p:style>
+        </p:cxnSp>
+        <p:cxnSp>
+          <p:nvCxnSpPr>
+            <p:cNvPr id="44" name="Gerade Verbindung mit Pfeil 43"/>
+            <p:cNvCxnSpPr/>
+            <p:nvPr/>
+          </p:nvCxnSpPr>
+          <p:spPr>
+            <a:xfrm>
+              <a:off x="5535302" y="2348880"/>
+              <a:ext cx="276475" cy="1559172"/>
+            </a:xfrm>
+            <a:prstGeom prst="straightConnector1">
+              <a:avLst/>
+            </a:prstGeom>
+            <a:ln w="12700">
+              <a:solidFill>
+                <a:schemeClr val="tx1"/>
+              </a:solidFill>
+              <a:prstDash val="dashDot"/>
+              <a:headEnd type="none" w="med" len="med"/>
+              <a:tailEnd type="none" w="med" len="med"/>
+            </a:ln>
+          </p:spPr>
+          <p:style>
+            <a:lnRef idx="1">
+              <a:schemeClr val="accent1"/>
+            </a:lnRef>
+            <a:fillRef idx="0">
+              <a:schemeClr val="accent1"/>
+            </a:fillRef>
+            <a:effectRef idx="0">
+              <a:schemeClr val="accent1"/>
+            </a:effectRef>
+            <a:fontRef idx="minor">
+              <a:schemeClr val="tx1"/>
+            </a:fontRef>
+          </p:style>
+        </p:cxnSp>
+        <p:cxnSp>
+          <p:nvCxnSpPr>
+            <p:cNvPr id="47" name="Gerade Verbindung mit Pfeil 46"/>
+            <p:cNvCxnSpPr/>
+            <p:nvPr/>
+          </p:nvCxnSpPr>
+          <p:spPr>
+            <a:xfrm>
+              <a:off x="5940152" y="2354473"/>
+              <a:ext cx="0" cy="1559173"/>
+            </a:xfrm>
+            <a:prstGeom prst="straightConnector1">
+              <a:avLst/>
+            </a:prstGeom>
+            <a:ln w="12700">
+              <a:solidFill>
+                <a:schemeClr val="tx1"/>
+              </a:solidFill>
+              <a:headEnd type="triangle" w="med" len="med"/>
+              <a:tailEnd type="triangle" w="med" len="med"/>
+            </a:ln>
+          </p:spPr>
+          <p:style>
+            <a:lnRef idx="1">
+              <a:schemeClr val="accent1"/>
+            </a:lnRef>
+            <a:fillRef idx="0">
+              <a:schemeClr val="accent1"/>
+            </a:fillRef>
+            <a:effectRef idx="0">
+              <a:schemeClr val="accent1"/>
+            </a:effectRef>
+            <a:fontRef idx="minor">
+              <a:schemeClr val="tx1"/>
+            </a:fontRef>
+          </p:style>
+        </p:cxnSp>
       </p:grpSp>
-      <p:cxnSp>
-        <p:nvCxnSpPr>
-          <p:cNvPr id="41" name="Gerade Verbindung 40"/>
-          <p:cNvCxnSpPr/>
-          <p:nvPr/>
-        </p:nvCxnSpPr>
-        <p:spPr>
-          <a:xfrm>
-            <a:off x="5404194" y="2332888"/>
-            <a:ext cx="601703" cy="0"/>
-          </a:xfrm>
-          <a:prstGeom prst="line">
-            <a:avLst/>
-          </a:prstGeom>
-          <a:ln w="19050">
-            <a:solidFill>
-              <a:schemeClr val="tx1"/>
-            </a:solidFill>
-          </a:ln>
-        </p:spPr>
-        <p:style>
-          <a:lnRef idx="1">
-            <a:schemeClr val="accent1"/>
-          </a:lnRef>
-          <a:fillRef idx="0">
-            <a:schemeClr val="accent1"/>
-          </a:fillRef>
-          <a:effectRef idx="0">
-            <a:schemeClr val="accent1"/>
-          </a:effectRef>
-          <a:fontRef idx="minor">
-            <a:schemeClr val="tx1"/>
-          </a:fontRef>
-        </p:style>
-      </p:cxnSp>
-      <p:cxnSp>
-        <p:nvCxnSpPr>
-          <p:cNvPr id="42" name="Gerade Verbindung 41"/>
-          <p:cNvCxnSpPr/>
-          <p:nvPr/>
-        </p:nvCxnSpPr>
-        <p:spPr>
-          <a:xfrm>
-            <a:off x="5554473" y="3925502"/>
-            <a:ext cx="529695" cy="0"/>
-          </a:xfrm>
-          <a:prstGeom prst="line">
-            <a:avLst/>
-          </a:prstGeom>
-          <a:ln w="19050">
-            <a:solidFill>
-              <a:schemeClr val="tx1"/>
-            </a:solidFill>
-          </a:ln>
-        </p:spPr>
-        <p:style>
-          <a:lnRef idx="1">
-            <a:schemeClr val="accent1"/>
-          </a:lnRef>
-          <a:fillRef idx="0">
-            <a:schemeClr val="accent1"/>
-          </a:fillRef>
-          <a:effectRef idx="0">
-            <a:schemeClr val="accent1"/>
-          </a:effectRef>
-          <a:fontRef idx="minor">
-            <a:schemeClr val="tx1"/>
-          </a:fontRef>
-        </p:style>
-      </p:cxnSp>
-      <p:cxnSp>
-        <p:nvCxnSpPr>
-          <p:cNvPr id="43" name="Gerade Verbindung mit Pfeil 42"/>
-          <p:cNvCxnSpPr/>
-          <p:nvPr/>
-        </p:nvCxnSpPr>
-        <p:spPr>
-          <a:xfrm>
-            <a:off x="5375645" y="2348880"/>
-            <a:ext cx="276475" cy="1559172"/>
-          </a:xfrm>
-          <a:prstGeom prst="straightConnector1">
-            <a:avLst/>
-          </a:prstGeom>
-          <a:ln>
-            <a:solidFill>
-              <a:schemeClr val="tx1"/>
-            </a:solidFill>
-            <a:headEnd type="none" w="med" len="med"/>
-            <a:tailEnd type="none" w="med" len="med"/>
-          </a:ln>
-        </p:spPr>
-        <p:style>
-          <a:lnRef idx="1">
-            <a:schemeClr val="accent1"/>
-          </a:lnRef>
-          <a:fillRef idx="0">
-            <a:schemeClr val="accent1"/>
-          </a:fillRef>
-          <a:effectRef idx="0">
-            <a:schemeClr val="accent1"/>
-          </a:effectRef>
-          <a:fontRef idx="minor">
-            <a:schemeClr val="tx1"/>
-          </a:fontRef>
-        </p:style>
-      </p:cxnSp>
-      <p:cxnSp>
-        <p:nvCxnSpPr>
-          <p:cNvPr id="44" name="Gerade Verbindung mit Pfeil 43"/>
-          <p:cNvCxnSpPr/>
-          <p:nvPr/>
-        </p:nvCxnSpPr>
-        <p:spPr>
-          <a:xfrm>
-            <a:off x="5535302" y="2348880"/>
-            <a:ext cx="276475" cy="1559172"/>
-          </a:xfrm>
-          <a:prstGeom prst="straightConnector1">
-            <a:avLst/>
-          </a:prstGeom>
-          <a:ln>
-            <a:solidFill>
-              <a:schemeClr val="tx1"/>
-            </a:solidFill>
-            <a:prstDash val="dashDot"/>
-            <a:headEnd type="none" w="med" len="med"/>
-            <a:tailEnd type="none" w="med" len="med"/>
-          </a:ln>
-        </p:spPr>
-        <p:style>
-          <a:lnRef idx="1">
-            <a:schemeClr val="accent1"/>
-          </a:lnRef>
-          <a:fillRef idx="0">
-            <a:schemeClr val="accent1"/>
-          </a:fillRef>
-          <a:effectRef idx="0">
-            <a:schemeClr val="accent1"/>
-          </a:effectRef>
-          <a:fontRef idx="minor">
-            <a:schemeClr val="tx1"/>
-          </a:fontRef>
-        </p:style>
-      </p:cxnSp>
-      <p:cxnSp>
-        <p:nvCxnSpPr>
-          <p:cNvPr id="47" name="Gerade Verbindung mit Pfeil 46"/>
-          <p:cNvCxnSpPr/>
-          <p:nvPr/>
-        </p:nvCxnSpPr>
-        <p:spPr>
-          <a:xfrm>
-            <a:off x="5940152" y="2354473"/>
-            <a:ext cx="0" cy="1559173"/>
-          </a:xfrm>
-          <a:prstGeom prst="straightConnector1">
-            <a:avLst/>
-          </a:prstGeom>
-          <a:ln>
-            <a:solidFill>
-              <a:schemeClr val="tx1"/>
-            </a:solidFill>
-            <a:headEnd type="triangle" w="med" len="med"/>
-            <a:tailEnd type="triangle" w="med" len="med"/>
-          </a:ln>
-        </p:spPr>
-        <p:style>
-          <a:lnRef idx="1">
-            <a:schemeClr val="accent1"/>
-          </a:lnRef>
-          <a:fillRef idx="0">
-            <a:schemeClr val="accent1"/>
-          </a:fillRef>
-          <a:effectRef idx="0">
-            <a:schemeClr val="accent1"/>
-          </a:effectRef>
-          <a:fontRef idx="minor">
-            <a:schemeClr val="tx1"/>
-          </a:fontRef>
-        </p:style>
-      </p:cxnSp>
       <mc:AlternateContent xmlns:mc="http://schemas.openxmlformats.org/markup-compatibility/2006">
         <mc:Choice xmlns:a14="http://schemas.microsoft.com/office/drawing/2010/main" Requires="a14">
           <p:sp>
@@ -4612,8 +4597,8 @@
             </p:nvSpPr>
             <p:spPr>
               <a:xfrm rot="16200000">
-                <a:off x="5271746" y="2996557"/>
-                <a:ext cx="1555106" cy="274627"/>
+                <a:off x="4749799" y="2682008"/>
+                <a:ext cx="2175917" cy="357534"/>
               </a:xfrm>
               <a:prstGeom prst="rect">
                 <a:avLst/>
@@ -4626,6 +4611,7 @@
               </a:bodyPr>
               <a:lstStyle/>
               <a:p>
+                <a:pPr/>
                 <a14:m>
                   <m:oMathPara xmlns:m="http://schemas.openxmlformats.org/officeDocument/2006/math">
                     <m:oMathParaPr>
@@ -4635,14 +4621,14 @@
                       <m:sSub>
                         <m:sSubPr>
                           <m:ctrlPr>
-                            <a:rPr lang="de-DE" sz="1100" i="1" dirty="0" smtClean="0">
+                            <a:rPr lang="de-DE" sz="1600" i="1" dirty="0" smtClean="0">
                               <a:latin typeface="Cambria Math"/>
                             </a:rPr>
                           </m:ctrlPr>
                         </m:sSubPr>
                         <m:e>
                           <m:r>
-                            <a:rPr lang="de-DE" sz="1100" b="0" i="1" dirty="0" smtClean="0">
+                            <a:rPr lang="de-DE" sz="1600" b="0" i="1" dirty="0" smtClean="0">
                               <a:latin typeface="Cambria Math"/>
                             </a:rPr>
                             <m:t>𝑓</m:t>
@@ -4650,7 +4636,7 @@
                         </m:e>
                         <m:sub>
                           <m:r>
-                            <a:rPr lang="de-DE" sz="1100" b="0" i="1" dirty="0" smtClean="0">
+                            <a:rPr lang="de-DE" sz="1600" b="0" i="1" dirty="0" smtClean="0">
                               <a:latin typeface="Cambria Math"/>
                             </a:rPr>
                             <m:t>𝑐h𝑖𝑟𝑝</m:t>
@@ -4658,7 +4644,7 @@
                         </m:sub>
                       </m:sSub>
                       <m:r>
-                        <a:rPr lang="de-DE" sz="1100" b="0" i="1" dirty="0" smtClean="0">
+                        <a:rPr lang="de-DE" sz="1600" b="0" i="1" dirty="0" smtClean="0">
                           <a:latin typeface="Cambria Math"/>
                         </a:rPr>
                         <m:t>=30…300</m:t>
@@ -4667,7 +4653,7 @@
                         <m:rPr>
                           <m:nor/>
                         </m:rPr>
-                        <a:rPr lang="de-DE" sz="1100" b="0" i="0" dirty="0" smtClean="0">
+                        <a:rPr lang="de-DE" sz="1600" b="0" i="0" dirty="0" smtClean="0">
                           <a:latin typeface="Cambria Math"/>
                         </a:rPr>
                         <m:t>MHz</m:t>
@@ -4675,7 +4661,7 @@
                     </m:oMath>
                   </m:oMathPara>
                 </a14:m>
-                <a:endParaRPr lang="de-DE" sz="1100" dirty="0"/>
+                <a:endParaRPr lang="de-DE" sz="1600" dirty="0"/>
               </a:p>
             </p:txBody>
           </p:sp>
@@ -4691,8 +4677,8 @@
             </p:nvSpPr>
             <p:spPr>
               <a:xfrm rot="16200000">
-                <a:off x="5271746" y="2996557"/>
-                <a:ext cx="1555106" cy="274627"/>
+                <a:off x="4749799" y="2682008"/>
+                <a:ext cx="2175917" cy="357534"/>
               </a:xfrm>
               <a:prstGeom prst="rect">
                 <a:avLst/>
@@ -4700,7 +4686,7 @@
               <a:blipFill rotWithShape="1">
                 <a:blip r:embed="rId2"/>
                 <a:stretch>
-                  <a:fillRect/>
+                  <a:fillRect r="-6780"/>
                 </a:stretch>
               </a:blipFill>
             </p:spPr>

</xml_diff>